<commit_message>
change commands cours linux
</commit_message>
<xml_diff>
--- a/Ymmersions/Ymmersion - Linux.pptx
+++ b/Ymmersions/Ymmersion - Linux.pptx
@@ -140,7 +140,7 @@
   <pc:docChgLst>
     <pc:chgData name="Jean-Philippe" userId="5b8fb71733062750" providerId="LiveId" clId="{2CD3FD61-1B0C-434F-869E-1E962A07C5C3}"/>
     <pc:docChg chg="undo redo custSel addSld delSld modSld sldOrd">
-      <pc:chgData name="Jean-Philippe" userId="5b8fb71733062750" providerId="LiveId" clId="{2CD3FD61-1B0C-434F-869E-1E962A07C5C3}" dt="2022-07-11T12:15:04.070" v="2020" actId="47"/>
+      <pc:chgData name="Jean-Philippe" userId="5b8fb71733062750" providerId="LiveId" clId="{2CD3FD61-1B0C-434F-869E-1E962A07C5C3}" dt="2022-07-12T08:13:35.787" v="2075" actId="20577"/>
       <pc:docMkLst>
         <pc:docMk/>
       </pc:docMkLst>
@@ -1715,7 +1715,7 @@
         </pc:graphicFrameChg>
       </pc:sldChg>
       <pc:sldChg chg="addSp delSp modSp new mod modNotesTx">
-        <pc:chgData name="Jean-Philippe" userId="5b8fb71733062750" providerId="LiveId" clId="{2CD3FD61-1B0C-434F-869E-1E962A07C5C3}" dt="2022-07-11T12:07:46.202" v="1972" actId="20577"/>
+        <pc:chgData name="Jean-Philippe" userId="5b8fb71733062750" providerId="LiveId" clId="{2CD3FD61-1B0C-434F-869E-1E962A07C5C3}" dt="2022-07-12T08:13:35.787" v="2075" actId="20577"/>
         <pc:sldMkLst>
           <pc:docMk/>
           <pc:sldMk cId="4282717010" sldId="268"/>
@@ -1737,7 +1737,7 @@
           </ac:spMkLst>
         </pc:spChg>
         <pc:spChg chg="add mod">
-          <ac:chgData name="Jean-Philippe" userId="5b8fb71733062750" providerId="LiveId" clId="{2CD3FD61-1B0C-434F-869E-1E962A07C5C3}" dt="2022-07-11T11:08:35.009" v="968" actId="404"/>
+          <ac:chgData name="Jean-Philippe" userId="5b8fb71733062750" providerId="LiveId" clId="{2CD3FD61-1B0C-434F-869E-1E962A07C5C3}" dt="2022-07-12T08:13:35.787" v="2075" actId="20577"/>
           <ac:spMkLst>
             <pc:docMk/>
             <pc:sldMk cId="4282717010" sldId="268"/>
@@ -11918,7 +11918,7 @@
           <a:p>
             <a:fld id="{0B756C37-B7B4-4FC9-A47B-AD2E4A185EBA}" type="datetimeFigureOut">
               <a:rPr lang="fr-FR" smtClean="0"/>
-              <a:t>11/07/2022</a:t>
+              <a:t>12/07/2022</a:t>
             </a:fld>
             <a:endParaRPr lang="fr-FR"/>
           </a:p>
@@ -13640,7 +13640,7 @@
           <a:p>
             <a:fld id="{2088DAF4-D1DB-4FA3-9D9F-47575B3C1E82}" type="datetimeFigureOut">
               <a:rPr lang="fr-FR" smtClean="0"/>
-              <a:t>11/07/2022</a:t>
+              <a:t>12/07/2022</a:t>
             </a:fld>
             <a:endParaRPr lang="fr-FR"/>
           </a:p>
@@ -13891,7 +13891,7 @@
           <a:p>
             <a:fld id="{2088DAF4-D1DB-4FA3-9D9F-47575B3C1E82}" type="datetimeFigureOut">
               <a:rPr lang="fr-FR" smtClean="0"/>
-              <a:t>11/07/2022</a:t>
+              <a:t>12/07/2022</a:t>
             </a:fld>
             <a:endParaRPr lang="fr-FR"/>
           </a:p>
@@ -14205,7 +14205,7 @@
           <a:p>
             <a:fld id="{2088DAF4-D1DB-4FA3-9D9F-47575B3C1E82}" type="datetimeFigureOut">
               <a:rPr lang="fr-FR" smtClean="0"/>
-              <a:t>11/07/2022</a:t>
+              <a:t>12/07/2022</a:t>
             </a:fld>
             <a:endParaRPr lang="fr-FR"/>
           </a:p>
@@ -14546,7 +14546,7 @@
           <a:p>
             <a:fld id="{2088DAF4-D1DB-4FA3-9D9F-47575B3C1E82}" type="datetimeFigureOut">
               <a:rPr lang="fr-FR" smtClean="0"/>
-              <a:t>11/07/2022</a:t>
+              <a:t>12/07/2022</a:t>
             </a:fld>
             <a:endParaRPr lang="fr-FR"/>
           </a:p>
@@ -14860,7 +14860,7 @@
           <a:p>
             <a:fld id="{2088DAF4-D1DB-4FA3-9D9F-47575B3C1E82}" type="datetimeFigureOut">
               <a:rPr lang="fr-FR" smtClean="0"/>
-              <a:t>11/07/2022</a:t>
+              <a:t>12/07/2022</a:t>
             </a:fld>
             <a:endParaRPr lang="fr-FR"/>
           </a:p>
@@ -15253,7 +15253,7 @@
           <a:p>
             <a:fld id="{2088DAF4-D1DB-4FA3-9D9F-47575B3C1E82}" type="datetimeFigureOut">
               <a:rPr lang="fr-FR" smtClean="0"/>
-              <a:t>11/07/2022</a:t>
+              <a:t>12/07/2022</a:t>
             </a:fld>
             <a:endParaRPr lang="fr-FR"/>
           </a:p>
@@ -15423,7 +15423,7 @@
           <a:p>
             <a:fld id="{2088DAF4-D1DB-4FA3-9D9F-47575B3C1E82}" type="datetimeFigureOut">
               <a:rPr lang="fr-FR" smtClean="0"/>
-              <a:t>11/07/2022</a:t>
+              <a:t>12/07/2022</a:t>
             </a:fld>
             <a:endParaRPr lang="fr-FR"/>
           </a:p>
@@ -15603,7 +15603,7 @@
           <a:p>
             <a:fld id="{2088DAF4-D1DB-4FA3-9D9F-47575B3C1E82}" type="datetimeFigureOut">
               <a:rPr lang="fr-FR" smtClean="0"/>
-              <a:t>11/07/2022</a:t>
+              <a:t>12/07/2022</a:t>
             </a:fld>
             <a:endParaRPr lang="fr-FR"/>
           </a:p>
@@ -15779,7 +15779,7 @@
           <a:p>
             <a:fld id="{2088DAF4-D1DB-4FA3-9D9F-47575B3C1E82}" type="datetimeFigureOut">
               <a:rPr lang="fr-FR" smtClean="0"/>
-              <a:t>11/07/2022</a:t>
+              <a:t>12/07/2022</a:t>
             </a:fld>
             <a:endParaRPr lang="fr-FR"/>
           </a:p>
@@ -16026,7 +16026,7 @@
           <a:p>
             <a:fld id="{2088DAF4-D1DB-4FA3-9D9F-47575B3C1E82}" type="datetimeFigureOut">
               <a:rPr lang="fr-FR" smtClean="0"/>
-              <a:t>11/07/2022</a:t>
+              <a:t>12/07/2022</a:t>
             </a:fld>
             <a:endParaRPr lang="fr-FR"/>
           </a:p>
@@ -16258,7 +16258,7 @@
           <a:p>
             <a:fld id="{2088DAF4-D1DB-4FA3-9D9F-47575B3C1E82}" type="datetimeFigureOut">
               <a:rPr lang="fr-FR" smtClean="0"/>
-              <a:t>11/07/2022</a:t>
+              <a:t>12/07/2022</a:t>
             </a:fld>
             <a:endParaRPr lang="fr-FR"/>
           </a:p>
@@ -16632,7 +16632,7 @@
           <a:p>
             <a:fld id="{2088DAF4-D1DB-4FA3-9D9F-47575B3C1E82}" type="datetimeFigureOut">
               <a:rPr lang="fr-FR" smtClean="0"/>
-              <a:t>11/07/2022</a:t>
+              <a:t>12/07/2022</a:t>
             </a:fld>
             <a:endParaRPr lang="fr-FR"/>
           </a:p>
@@ -16755,7 +16755,7 @@
           <a:p>
             <a:fld id="{2088DAF4-D1DB-4FA3-9D9F-47575B3C1E82}" type="datetimeFigureOut">
               <a:rPr lang="fr-FR" smtClean="0"/>
-              <a:t>11/07/2022</a:t>
+              <a:t>12/07/2022</a:t>
             </a:fld>
             <a:endParaRPr lang="fr-FR"/>
           </a:p>
@@ -16850,7 +16850,7 @@
           <a:p>
             <a:fld id="{2088DAF4-D1DB-4FA3-9D9F-47575B3C1E82}" type="datetimeFigureOut">
               <a:rPr lang="fr-FR" smtClean="0"/>
-              <a:t>11/07/2022</a:t>
+              <a:t>12/07/2022</a:t>
             </a:fld>
             <a:endParaRPr lang="fr-FR"/>
           </a:p>
@@ -17105,7 +17105,7 @@
           <a:p>
             <a:fld id="{2088DAF4-D1DB-4FA3-9D9F-47575B3C1E82}" type="datetimeFigureOut">
               <a:rPr lang="fr-FR" smtClean="0"/>
-              <a:t>11/07/2022</a:t>
+              <a:t>12/07/2022</a:t>
             </a:fld>
             <a:endParaRPr lang="fr-FR"/>
           </a:p>
@@ -17368,7 +17368,7 @@
           <a:p>
             <a:fld id="{2088DAF4-D1DB-4FA3-9D9F-47575B3C1E82}" type="datetimeFigureOut">
               <a:rPr lang="fr-FR" smtClean="0"/>
-              <a:t>11/07/2022</a:t>
+              <a:t>12/07/2022</a:t>
             </a:fld>
             <a:endParaRPr lang="fr-FR"/>
           </a:p>
@@ -18111,7 +18111,7 @@
           <a:p>
             <a:fld id="{2088DAF4-D1DB-4FA3-9D9F-47575B3C1E82}" type="datetimeFigureOut">
               <a:rPr lang="fr-FR" smtClean="0"/>
-              <a:t>11/07/2022</a:t>
+              <a:t>12/07/2022</a:t>
             </a:fld>
             <a:endParaRPr lang="fr-FR"/>
           </a:p>
@@ -20192,7 +20192,7 @@
         <p:spPr>
           <a:xfrm>
             <a:off x="1286933" y="1424940"/>
-            <a:ext cx="6382228" cy="4924425"/>
+            <a:ext cx="6382228" cy="5262979"/>
           </a:xfrm>
           <a:prstGeom prst="rect">
             <a:avLst/>
@@ -20316,6 +20316,28 @@
               <a:rPr lang="fr-FR" sz="1600" dirty="0"/>
               <a:t> lister le dossier</a:t>
             </a:r>
+          </a:p>
+          <a:p>
+            <a:pPr marL="342900" indent="-342900">
+              <a:buFontTx/>
+              <a:buChar char="-"/>
+            </a:pPr>
+            <a:endParaRPr lang="fr-FR" sz="1600" dirty="0"/>
+          </a:p>
+          <a:p>
+            <a:pPr marL="342900" indent="-342900">
+              <a:buFontTx/>
+              <a:buChar char="-"/>
+            </a:pPr>
+            <a:r>
+              <a:rPr lang="fr-FR" sz="1600" b="1" dirty="0"/>
+              <a:t>ln</a:t>
+            </a:r>
+            <a:r>
+              <a:rPr lang="fr-FR" sz="1600" dirty="0"/>
+              <a:t> créer des liens</a:t>
+            </a:r>
+            <a:endParaRPr lang="fr-FR" sz="1600" b="1" dirty="0"/>
           </a:p>
           <a:p>
             <a:pPr marL="342900" indent="-342900">

</xml_diff>